<commit_message>
key and annotation files
</commit_message>
<xml_diff>
--- a/Images/CassisExplanation.pptx
+++ b/Images/CassisExplanation.pptx
@@ -205,7 +205,7 @@
           <a:p>
             <a:fld id="{CCE1BE07-DB1E-DD4D-95B4-39968E1006CC}" type="datetimeFigureOut">
               <a:rPr lang="en-US" smtClean="0"/>
-              <a:t>6/1/23</a:t>
+              <a:t>6/19/23</a:t>
             </a:fld>
             <a:endParaRPr lang="en-US"/>
           </a:p>
@@ -794,7 +794,7 @@
           <a:p>
             <a:fld id="{179D03FE-D8A3-2042-95A0-B24C7ABF8C01}" type="datetime1">
               <a:rPr lang="en-US" smtClean="0"/>
-              <a:t>6/1/23</a:t>
+              <a:t>6/19/23</a:t>
             </a:fld>
             <a:endParaRPr lang="en-US"/>
           </a:p>
@@ -964,7 +964,7 @@
           <a:p>
             <a:fld id="{C5DA49BC-A37D-164B-9147-A93340725733}" type="datetime1">
               <a:rPr lang="en-US" smtClean="0"/>
-              <a:t>6/1/23</a:t>
+              <a:t>6/19/23</a:t>
             </a:fld>
             <a:endParaRPr lang="en-US"/>
           </a:p>
@@ -1144,7 +1144,7 @@
           <a:p>
             <a:fld id="{62BED9FC-42E4-E84B-A833-20C9434B7CCC}" type="datetime1">
               <a:rPr lang="en-US" smtClean="0"/>
-              <a:t>6/1/23</a:t>
+              <a:t>6/19/23</a:t>
             </a:fld>
             <a:endParaRPr lang="en-US"/>
           </a:p>
@@ -1314,7 +1314,7 @@
           <a:p>
             <a:fld id="{4F075BA5-4A6F-F248-A068-EB2A0C7A0785}" type="datetime1">
               <a:rPr lang="en-US" smtClean="0"/>
-              <a:t>6/1/23</a:t>
+              <a:t>6/19/23</a:t>
             </a:fld>
             <a:endParaRPr lang="en-US"/>
           </a:p>
@@ -1560,7 +1560,7 @@
           <a:p>
             <a:fld id="{9C9ED383-CE43-0A4C-8FA1-1A4C4DF241DC}" type="datetime1">
               <a:rPr lang="en-US" smtClean="0"/>
-              <a:t>6/1/23</a:t>
+              <a:t>6/19/23</a:t>
             </a:fld>
             <a:endParaRPr lang="en-US"/>
           </a:p>
@@ -1792,7 +1792,7 @@
           <a:p>
             <a:fld id="{1A7D77EF-0F71-2D4A-A619-CA3529E14D0F}" type="datetime1">
               <a:rPr lang="en-US" smtClean="0"/>
-              <a:t>6/1/23</a:t>
+              <a:t>6/19/23</a:t>
             </a:fld>
             <a:endParaRPr lang="en-US"/>
           </a:p>
@@ -2159,7 +2159,7 @@
           <a:p>
             <a:fld id="{8D9AF9D1-1897-4D4F-9AFC-71854A24DA08}" type="datetime1">
               <a:rPr lang="en-US" smtClean="0"/>
-              <a:t>6/1/23</a:t>
+              <a:t>6/19/23</a:t>
             </a:fld>
             <a:endParaRPr lang="en-US"/>
           </a:p>
@@ -2277,7 +2277,7 @@
           <a:p>
             <a:fld id="{029F23BF-F4C8-9240-8E54-8EBB060A47C1}" type="datetime1">
               <a:rPr lang="en-US" smtClean="0"/>
-              <a:t>6/1/23</a:t>
+              <a:t>6/19/23</a:t>
             </a:fld>
             <a:endParaRPr lang="en-US"/>
           </a:p>
@@ -2372,7 +2372,7 @@
           <a:p>
             <a:fld id="{E70030E9-F740-224E-96AE-54C5E583283B}" type="datetime1">
               <a:rPr lang="en-US" smtClean="0"/>
-              <a:t>6/1/23</a:t>
+              <a:t>6/19/23</a:t>
             </a:fld>
             <a:endParaRPr lang="en-US"/>
           </a:p>
@@ -2649,7 +2649,7 @@
           <a:p>
             <a:fld id="{23447956-F1B3-8643-B986-64854C06E0F8}" type="datetime1">
               <a:rPr lang="en-US" smtClean="0"/>
-              <a:t>6/1/23</a:t>
+              <a:t>6/19/23</a:t>
             </a:fld>
             <a:endParaRPr lang="en-US"/>
           </a:p>
@@ -2906,7 +2906,7 @@
           <a:p>
             <a:fld id="{0B6F4EEE-FA37-7742-9798-BACCD1E22175}" type="datetime1">
               <a:rPr lang="en-US" smtClean="0"/>
-              <a:t>6/1/23</a:t>
+              <a:t>6/19/23</a:t>
             </a:fld>
             <a:endParaRPr lang="en-US"/>
           </a:p>
@@ -3119,7 +3119,7 @@
           <a:p>
             <a:fld id="{7E4ECDC8-E124-044A-B093-1336FFEE8BA5}" type="datetime1">
               <a:rPr lang="en-US" smtClean="0"/>
-              <a:t>6/1/23</a:t>
+              <a:t>6/19/23</a:t>
             </a:fld>
             <a:endParaRPr lang="en-US"/>
           </a:p>
@@ -5590,7 +5590,7 @@
               <a:rPr lang="en-US" smtClean="0"/>
               <a:t>3</a:t>
             </a:fld>
-            <a:endParaRPr lang="en-US"/>
+            <a:endParaRPr lang="en-US" dirty="0"/>
           </a:p>
         </p:txBody>
       </p:sp>
@@ -7700,6 +7700,40 @@
           </a:fontRef>
         </p:style>
       </p:cxnSp>
+      <p:sp>
+        <p:nvSpPr>
+          <p:cNvPr id="2" name="Slide Number Placeholder 1">
+            <a:extLst>
+              <a:ext uri="{FF2B5EF4-FFF2-40B4-BE49-F238E27FC236}">
+                <a16:creationId xmlns:a16="http://schemas.microsoft.com/office/drawing/2014/main" id="{4E388A92-EC82-5CFE-7570-E3752A383B45}"/>
+              </a:ext>
+            </a:extLst>
+          </p:cNvPr>
+          <p:cNvSpPr>
+            <a:spLocks noGrp="1"/>
+          </p:cNvSpPr>
+          <p:nvPr>
+            <p:ph type="sldNum" sz="quarter" idx="12"/>
+          </p:nvPr>
+        </p:nvSpPr>
+        <p:spPr>
+          <a:xfrm>
+            <a:off x="8610600" y="6356350"/>
+            <a:ext cx="2743200" cy="365125"/>
+          </a:xfrm>
+        </p:spPr>
+        <p:txBody>
+          <a:bodyPr/>
+          <a:lstStyle/>
+          <a:p>
+            <a:fld id="{6FD46872-9187-D449-8E74-42DAD81B7612}" type="slidenum">
+              <a:rPr lang="en-US" smtClean="0"/>
+              <a:t>4</a:t>
+            </a:fld>
+            <a:endParaRPr lang="en-US" dirty="0"/>
+          </a:p>
+        </p:txBody>
+      </p:sp>
     </p:spTree>
     <p:extLst>
       <p:ext uri="{BB962C8B-B14F-4D97-AF65-F5344CB8AC3E}">
@@ -8424,6 +8458,40 @@
               <a:rPr lang="en-US" sz="1600" b="1" dirty="0"/>
               <a:t>ICS</a:t>
             </a:r>
+          </a:p>
+        </p:txBody>
+      </p:sp>
+      <p:sp>
+        <p:nvSpPr>
+          <p:cNvPr id="2" name="Slide Number Placeholder 1">
+            <a:extLst>
+              <a:ext uri="{FF2B5EF4-FFF2-40B4-BE49-F238E27FC236}">
+                <a16:creationId xmlns:a16="http://schemas.microsoft.com/office/drawing/2014/main" id="{A2F7117D-F274-421F-EC85-8529337A478C}"/>
+              </a:ext>
+            </a:extLst>
+          </p:cNvPr>
+          <p:cNvSpPr>
+            <a:spLocks noGrp="1"/>
+          </p:cNvSpPr>
+          <p:nvPr>
+            <p:ph type="sldNum" sz="quarter" idx="12"/>
+          </p:nvPr>
+        </p:nvSpPr>
+        <p:spPr>
+          <a:xfrm>
+            <a:off x="8610600" y="6356350"/>
+            <a:ext cx="2743200" cy="365125"/>
+          </a:xfrm>
+        </p:spPr>
+        <p:txBody>
+          <a:bodyPr/>
+          <a:lstStyle/>
+          <a:p>
+            <a:fld id="{6FD46872-9187-D449-8E74-42DAD81B7612}" type="slidenum">
+              <a:rPr lang="en-US" smtClean="0"/>
+              <a:t>5</a:t>
+            </a:fld>
+            <a:endParaRPr lang="en-US" dirty="0"/>
           </a:p>
         </p:txBody>
       </p:sp>

</xml_diff>